<commit_message>
added image, removed one. Fix #37
</commit_message>
<xml_diff>
--- a/development/images/images.pptx
+++ b/development/images/images.pptx
@@ -245,7 +245,7 @@
           <a:p>
             <a:fld id="{1BF106E0-D9A9-4871-B05C-012AD2983C8F}" type="datetimeFigureOut">
               <a:rPr lang="en-US" smtClean="0"/>
-              <a:t>7/24/2018</a:t>
+              <a:t>8/3/2018</a:t>
             </a:fld>
             <a:endParaRPr lang="en-US"/>
           </a:p>
@@ -415,7 +415,7 @@
           <a:p>
             <a:fld id="{1BF106E0-D9A9-4871-B05C-012AD2983C8F}" type="datetimeFigureOut">
               <a:rPr lang="en-US" smtClean="0"/>
-              <a:t>7/24/2018</a:t>
+              <a:t>8/3/2018</a:t>
             </a:fld>
             <a:endParaRPr lang="en-US"/>
           </a:p>
@@ -595,7 +595,7 @@
           <a:p>
             <a:fld id="{1BF106E0-D9A9-4871-B05C-012AD2983C8F}" type="datetimeFigureOut">
               <a:rPr lang="en-US" smtClean="0"/>
-              <a:t>7/24/2018</a:t>
+              <a:t>8/3/2018</a:t>
             </a:fld>
             <a:endParaRPr lang="en-US"/>
           </a:p>
@@ -765,7 +765,7 @@
           <a:p>
             <a:fld id="{1BF106E0-D9A9-4871-B05C-012AD2983C8F}" type="datetimeFigureOut">
               <a:rPr lang="en-US" smtClean="0"/>
-              <a:t>7/24/2018</a:t>
+              <a:t>8/3/2018</a:t>
             </a:fld>
             <a:endParaRPr lang="en-US"/>
           </a:p>
@@ -1011,7 +1011,7 @@
           <a:p>
             <a:fld id="{1BF106E0-D9A9-4871-B05C-012AD2983C8F}" type="datetimeFigureOut">
               <a:rPr lang="en-US" smtClean="0"/>
-              <a:t>7/24/2018</a:t>
+              <a:t>8/3/2018</a:t>
             </a:fld>
             <a:endParaRPr lang="en-US"/>
           </a:p>
@@ -1243,7 +1243,7 @@
           <a:p>
             <a:fld id="{1BF106E0-D9A9-4871-B05C-012AD2983C8F}" type="datetimeFigureOut">
               <a:rPr lang="en-US" smtClean="0"/>
-              <a:t>7/24/2018</a:t>
+              <a:t>8/3/2018</a:t>
             </a:fld>
             <a:endParaRPr lang="en-US"/>
           </a:p>
@@ -1610,7 +1610,7 @@
           <a:p>
             <a:fld id="{1BF106E0-D9A9-4871-B05C-012AD2983C8F}" type="datetimeFigureOut">
               <a:rPr lang="en-US" smtClean="0"/>
-              <a:t>7/24/2018</a:t>
+              <a:t>8/3/2018</a:t>
             </a:fld>
             <a:endParaRPr lang="en-US"/>
           </a:p>
@@ -1728,7 +1728,7 @@
           <a:p>
             <a:fld id="{1BF106E0-D9A9-4871-B05C-012AD2983C8F}" type="datetimeFigureOut">
               <a:rPr lang="en-US" smtClean="0"/>
-              <a:t>7/24/2018</a:t>
+              <a:t>8/3/2018</a:t>
             </a:fld>
             <a:endParaRPr lang="en-US"/>
           </a:p>
@@ -1823,7 +1823,7 @@
           <a:p>
             <a:fld id="{1BF106E0-D9A9-4871-B05C-012AD2983C8F}" type="datetimeFigureOut">
               <a:rPr lang="en-US" smtClean="0"/>
-              <a:t>7/24/2018</a:t>
+              <a:t>8/3/2018</a:t>
             </a:fld>
             <a:endParaRPr lang="en-US"/>
           </a:p>
@@ -2100,7 +2100,7 @@
           <a:p>
             <a:fld id="{1BF106E0-D9A9-4871-B05C-012AD2983C8F}" type="datetimeFigureOut">
               <a:rPr lang="en-US" smtClean="0"/>
-              <a:t>7/24/2018</a:t>
+              <a:t>8/3/2018</a:t>
             </a:fld>
             <a:endParaRPr lang="en-US"/>
           </a:p>
@@ -2353,7 +2353,7 @@
           <a:p>
             <a:fld id="{1BF106E0-D9A9-4871-B05C-012AD2983C8F}" type="datetimeFigureOut">
               <a:rPr lang="en-US" smtClean="0"/>
-              <a:t>7/24/2018</a:t>
+              <a:t>8/3/2018</a:t>
             </a:fld>
             <a:endParaRPr lang="en-US"/>
           </a:p>
@@ -2566,7 +2566,7 @@
           <a:p>
             <a:fld id="{1BF106E0-D9A9-4871-B05C-012AD2983C8F}" type="datetimeFigureOut">
               <a:rPr lang="en-US" smtClean="0"/>
-              <a:t>7/24/2018</a:t>
+              <a:t>8/3/2018</a:t>
             </a:fld>
             <a:endParaRPr lang="en-US"/>
           </a:p>
@@ -4203,6 +4203,45 @@
           </p:txBody>
         </p:sp>
       </p:grpSp>
+      <p:sp>
+        <p:nvSpPr>
+          <p:cNvPr id="35" name="Down Arrow 34"/>
+          <p:cNvSpPr/>
+          <p:nvPr/>
+        </p:nvSpPr>
+        <p:spPr>
+          <a:xfrm rot="10800000">
+            <a:off x="9764454" y="619645"/>
+            <a:ext cx="1690255" cy="1178560"/>
+          </a:xfrm>
+          <a:prstGeom prst="downArrow">
+            <a:avLst/>
+          </a:prstGeom>
+          <a:ln/>
+        </p:spPr>
+        <p:style>
+          <a:lnRef idx="3">
+            <a:schemeClr val="lt1"/>
+          </a:lnRef>
+          <a:fillRef idx="1">
+            <a:schemeClr val="accent6"/>
+          </a:fillRef>
+          <a:effectRef idx="1">
+            <a:schemeClr val="accent6"/>
+          </a:effectRef>
+          <a:fontRef idx="minor">
+            <a:schemeClr val="lt1"/>
+          </a:fontRef>
+        </p:style>
+        <p:txBody>
+          <a:bodyPr rtlCol="0" anchor="ctr"/>
+          <a:lstStyle/>
+          <a:p>
+            <a:pPr algn="ctr"/>
+            <a:endParaRPr lang="en-US"/>
+          </a:p>
+        </p:txBody>
+      </p:sp>
     </p:spTree>
     <p:extLst>
       <p:ext uri="{BB962C8B-B14F-4D97-AF65-F5344CB8AC3E}">

</xml_diff>